<commit_message>
Model Creation, tuning, and comparision added. Removing Redundant feature selection and model creation.
</commit_message>
<xml_diff>
--- a/Presentation.pptx
+++ b/Presentation.pptx
@@ -6,7 +6,16 @@
   </p:sldMasterIdLst>
   <p:sldIdLst>
     <p:sldId id="256" r:id="rId2"/>
-    <p:sldId id="257" r:id="rId3"/>
+    <p:sldId id="267" r:id="rId3"/>
+    <p:sldId id="258" r:id="rId4"/>
+    <p:sldId id="259" r:id="rId5"/>
+    <p:sldId id="260" r:id="rId6"/>
+    <p:sldId id="261" r:id="rId7"/>
+    <p:sldId id="262" r:id="rId8"/>
+    <p:sldId id="263" r:id="rId9"/>
+    <p:sldId id="264" r:id="rId10"/>
+    <p:sldId id="265" r:id="rId11"/>
+    <p:sldId id="266" r:id="rId12"/>
   </p:sldIdLst>
   <p:sldSz cx="12192000" cy="6858000"/>
   <p:notesSz cx="6858000" cy="9144000"/>
@@ -105,6 +114,11 @@
       </a:defRPr>
     </a:lvl9pPr>
   </p:defaultTextStyle>
+  <p:extLst>
+    <p:ext uri="{EFAFB233-063F-42B5-8137-9DF3F51BA10A}">
+      <p15:sldGuideLst xmlns:p15="http://schemas.microsoft.com/office/powerpoint/2012/main"/>
+    </p:ext>
+  </p:extLst>
 </p:presentation>
 </file>
 
@@ -255,7 +269,7 @@
           <a:p>
             <a:fld id="{F29689D5-C0AD-4FD8-894E-65C628727F57}" type="datetimeFigureOut">
               <a:rPr lang="en-US" smtClean="0"/>
-              <a:t>7/26/2021</a:t>
+              <a:t>8/9/2021</a:t>
             </a:fld>
             <a:endParaRPr lang="en-US"/>
           </a:p>
@@ -453,7 +467,7 @@
           <a:p>
             <a:fld id="{F29689D5-C0AD-4FD8-894E-65C628727F57}" type="datetimeFigureOut">
               <a:rPr lang="en-US" smtClean="0"/>
-              <a:t>7/26/2021</a:t>
+              <a:t>8/9/2021</a:t>
             </a:fld>
             <a:endParaRPr lang="en-US"/>
           </a:p>
@@ -661,7 +675,7 @@
           <a:p>
             <a:fld id="{F29689D5-C0AD-4FD8-894E-65C628727F57}" type="datetimeFigureOut">
               <a:rPr lang="en-US" smtClean="0"/>
-              <a:t>7/26/2021</a:t>
+              <a:t>8/9/2021</a:t>
             </a:fld>
             <a:endParaRPr lang="en-US"/>
           </a:p>
@@ -859,7 +873,7 @@
           <a:p>
             <a:fld id="{F29689D5-C0AD-4FD8-894E-65C628727F57}" type="datetimeFigureOut">
               <a:rPr lang="en-US" smtClean="0"/>
-              <a:t>7/26/2021</a:t>
+              <a:t>8/9/2021</a:t>
             </a:fld>
             <a:endParaRPr lang="en-US"/>
           </a:p>
@@ -1134,7 +1148,7 @@
           <a:p>
             <a:fld id="{F29689D5-C0AD-4FD8-894E-65C628727F57}" type="datetimeFigureOut">
               <a:rPr lang="en-US" smtClean="0"/>
-              <a:t>7/26/2021</a:t>
+              <a:t>8/9/2021</a:t>
             </a:fld>
             <a:endParaRPr lang="en-US"/>
           </a:p>
@@ -1399,7 +1413,7 @@
           <a:p>
             <a:fld id="{F29689D5-C0AD-4FD8-894E-65C628727F57}" type="datetimeFigureOut">
               <a:rPr lang="en-US" smtClean="0"/>
-              <a:t>7/26/2021</a:t>
+              <a:t>8/9/2021</a:t>
             </a:fld>
             <a:endParaRPr lang="en-US"/>
           </a:p>
@@ -1811,7 +1825,7 @@
           <a:p>
             <a:fld id="{F29689D5-C0AD-4FD8-894E-65C628727F57}" type="datetimeFigureOut">
               <a:rPr lang="en-US" smtClean="0"/>
-              <a:t>7/26/2021</a:t>
+              <a:t>8/9/2021</a:t>
             </a:fld>
             <a:endParaRPr lang="en-US"/>
           </a:p>
@@ -1952,7 +1966,7 @@
           <a:p>
             <a:fld id="{F29689D5-C0AD-4FD8-894E-65C628727F57}" type="datetimeFigureOut">
               <a:rPr lang="en-US" smtClean="0"/>
-              <a:t>7/26/2021</a:t>
+              <a:t>8/9/2021</a:t>
             </a:fld>
             <a:endParaRPr lang="en-US"/>
           </a:p>
@@ -2065,7 +2079,7 @@
           <a:p>
             <a:fld id="{F29689D5-C0AD-4FD8-894E-65C628727F57}" type="datetimeFigureOut">
               <a:rPr lang="en-US" smtClean="0"/>
-              <a:t>7/26/2021</a:t>
+              <a:t>8/9/2021</a:t>
             </a:fld>
             <a:endParaRPr lang="en-US"/>
           </a:p>
@@ -2376,7 +2390,7 @@
           <a:p>
             <a:fld id="{F29689D5-C0AD-4FD8-894E-65C628727F57}" type="datetimeFigureOut">
               <a:rPr lang="en-US" smtClean="0"/>
-              <a:t>7/26/2021</a:t>
+              <a:t>8/9/2021</a:t>
             </a:fld>
             <a:endParaRPr lang="en-US"/>
           </a:p>
@@ -2664,7 +2678,7 @@
           <a:p>
             <a:fld id="{F29689D5-C0AD-4FD8-894E-65C628727F57}" type="datetimeFigureOut">
               <a:rPr lang="en-US" smtClean="0"/>
-              <a:t>7/26/2021</a:t>
+              <a:t>8/9/2021</a:t>
             </a:fld>
             <a:endParaRPr lang="en-US"/>
           </a:p>
@@ -2905,7 +2919,7 @@
           <a:p>
             <a:fld id="{F29689D5-C0AD-4FD8-894E-65C628727F57}" type="datetimeFigureOut">
               <a:rPr lang="en-US" smtClean="0"/>
-              <a:t>7/26/2021</a:t>
+              <a:t>8/9/2021</a:t>
             </a:fld>
             <a:endParaRPr lang="en-US"/>
           </a:p>
@@ -3343,7 +3357,7 @@
           <a:bodyPr/>
           <a:lstStyle/>
           <a:p>
-            <a:endParaRPr lang="en-US"/>
+            <a:endParaRPr lang="en-US" dirty="0"/>
           </a:p>
         </p:txBody>
       </p:sp>
@@ -3376,6 +3390,199 @@
     <p:extLst>
       <p:ext uri="{BB962C8B-B14F-4D97-AF65-F5344CB8AC3E}">
         <p14:creationId xmlns:p14="http://schemas.microsoft.com/office/powerpoint/2010/main" val="3194964530"/>
+      </p:ext>
+    </p:extLst>
+  </p:cSld>
+  <p:clrMapOvr>
+    <a:masterClrMapping/>
+  </p:clrMapOvr>
+</p:sld>
+</file>
+
+<file path=ppt/slides/slide10.xml><?xml version="1.0" encoding="utf-8"?>
+<p:sld xmlns:a="http://schemas.openxmlformats.org/drawingml/2006/main" xmlns:r="http://schemas.openxmlformats.org/officeDocument/2006/relationships" xmlns:p="http://schemas.openxmlformats.org/presentationml/2006/main">
+  <p:cSld>
+    <p:spTree>
+      <p:nvGrpSpPr>
+        <p:cNvPr id="1" name=""/>
+        <p:cNvGrpSpPr/>
+        <p:nvPr/>
+      </p:nvGrpSpPr>
+      <p:grpSpPr>
+        <a:xfrm>
+          <a:off x="0" y="0"/>
+          <a:ext cx="0" cy="0"/>
+          <a:chOff x="0" y="0"/>
+          <a:chExt cx="0" cy="0"/>
+        </a:xfrm>
+      </p:grpSpPr>
+      <p:sp>
+        <p:nvSpPr>
+          <p:cNvPr id="2" name="Title 1">
+            <a:extLst>
+              <a:ext uri="{FF2B5EF4-FFF2-40B4-BE49-F238E27FC236}">
+                <a16:creationId xmlns:a16="http://schemas.microsoft.com/office/drawing/2014/main" id="{928487A1-96D9-4E88-AF40-64485CC43659}"/>
+              </a:ext>
+            </a:extLst>
+          </p:cNvPr>
+          <p:cNvSpPr>
+            <a:spLocks noGrp="1"/>
+          </p:cNvSpPr>
+          <p:nvPr>
+            <p:ph type="title"/>
+          </p:nvPr>
+        </p:nvSpPr>
+        <p:spPr/>
+        <p:txBody>
+          <a:bodyPr/>
+          <a:lstStyle/>
+          <a:p>
+            <a:r>
+              <a:rPr lang="en-US" dirty="0"/>
+              <a:t>What does this mean for your house</a:t>
+            </a:r>
+          </a:p>
+        </p:txBody>
+      </p:sp>
+      <p:sp>
+        <p:nvSpPr>
+          <p:cNvPr id="3" name="Content Placeholder 2">
+            <a:extLst>
+              <a:ext uri="{FF2B5EF4-FFF2-40B4-BE49-F238E27FC236}">
+                <a16:creationId xmlns:a16="http://schemas.microsoft.com/office/drawing/2014/main" id="{DFF97AD6-45C3-4006-821D-BA1406A77EB5}"/>
+              </a:ext>
+            </a:extLst>
+          </p:cNvPr>
+          <p:cNvSpPr>
+            <a:spLocks noGrp="1"/>
+          </p:cNvSpPr>
+          <p:nvPr>
+            <p:ph idx="1"/>
+          </p:nvPr>
+        </p:nvSpPr>
+        <p:spPr/>
+        <p:txBody>
+          <a:bodyPr/>
+          <a:lstStyle/>
+          <a:p>
+            <a:endParaRPr lang="en-US"/>
+          </a:p>
+        </p:txBody>
+      </p:sp>
+    </p:spTree>
+    <p:extLst>
+      <p:ext uri="{BB962C8B-B14F-4D97-AF65-F5344CB8AC3E}">
+        <p14:creationId xmlns:p14="http://schemas.microsoft.com/office/powerpoint/2010/main" val="433838720"/>
+      </p:ext>
+    </p:extLst>
+  </p:cSld>
+  <p:clrMapOvr>
+    <a:masterClrMapping/>
+  </p:clrMapOvr>
+</p:sld>
+</file>
+
+<file path=ppt/slides/slide11.xml><?xml version="1.0" encoding="utf-8"?>
+<p:sld xmlns:a="http://schemas.openxmlformats.org/drawingml/2006/main" xmlns:r="http://schemas.openxmlformats.org/officeDocument/2006/relationships" xmlns:p="http://schemas.openxmlformats.org/presentationml/2006/main">
+  <p:cSld>
+    <p:spTree>
+      <p:nvGrpSpPr>
+        <p:cNvPr id="1" name=""/>
+        <p:cNvGrpSpPr/>
+        <p:nvPr/>
+      </p:nvGrpSpPr>
+      <p:grpSpPr>
+        <a:xfrm>
+          <a:off x="0" y="0"/>
+          <a:ext cx="0" cy="0"/>
+          <a:chOff x="0" y="0"/>
+          <a:chExt cx="0" cy="0"/>
+        </a:xfrm>
+      </p:grpSpPr>
+      <p:sp>
+        <p:nvSpPr>
+          <p:cNvPr id="2" name="Title 1">
+            <a:extLst>
+              <a:ext uri="{FF2B5EF4-FFF2-40B4-BE49-F238E27FC236}">
+                <a16:creationId xmlns:a16="http://schemas.microsoft.com/office/drawing/2014/main" id="{928487A1-96D9-4E88-AF40-64485CC43659}"/>
+              </a:ext>
+            </a:extLst>
+          </p:cNvPr>
+          <p:cNvSpPr>
+            <a:spLocks noGrp="1"/>
+          </p:cNvSpPr>
+          <p:nvPr>
+            <p:ph type="title"/>
+          </p:nvPr>
+        </p:nvSpPr>
+        <p:spPr/>
+        <p:txBody>
+          <a:bodyPr/>
+          <a:lstStyle/>
+          <a:p>
+            <a:r>
+              <a:rPr lang="en-US" dirty="0"/>
+              <a:t>Conclusion</a:t>
+            </a:r>
+          </a:p>
+        </p:txBody>
+      </p:sp>
+      <p:sp>
+        <p:nvSpPr>
+          <p:cNvPr id="3" name="Content Placeholder 2">
+            <a:extLst>
+              <a:ext uri="{FF2B5EF4-FFF2-40B4-BE49-F238E27FC236}">
+                <a16:creationId xmlns:a16="http://schemas.microsoft.com/office/drawing/2014/main" id="{DFF97AD6-45C3-4006-821D-BA1406A77EB5}"/>
+              </a:ext>
+            </a:extLst>
+          </p:cNvPr>
+          <p:cNvSpPr>
+            <a:spLocks noGrp="1"/>
+          </p:cNvSpPr>
+          <p:nvPr>
+            <p:ph idx="1"/>
+          </p:nvPr>
+        </p:nvSpPr>
+        <p:spPr/>
+        <p:txBody>
+          <a:bodyPr/>
+          <a:lstStyle/>
+          <a:p>
+            <a:r>
+              <a:rPr lang="en-US" dirty="0"/>
+              <a:t>We can predict your value this well</a:t>
+            </a:r>
+          </a:p>
+          <a:p>
+            <a:r>
+              <a:rPr lang="en-US" dirty="0"/>
+              <a:t>These are the best ways to improve you house</a:t>
+            </a:r>
+          </a:p>
+          <a:p>
+            <a:r>
+              <a:rPr lang="en-US" dirty="0"/>
+              <a:t>This is what you should consider when buying a new one</a:t>
+            </a:r>
+          </a:p>
+          <a:p>
+            <a:endParaRPr lang="en-US" dirty="0"/>
+          </a:p>
+          <a:p>
+            <a:endParaRPr lang="en-US" dirty="0"/>
+          </a:p>
+          <a:p>
+            <a:r>
+              <a:rPr lang="en-US" dirty="0"/>
+              <a:t>Is it better to buy the best home in a bad neighborhood or the worst in a good one?</a:t>
+            </a:r>
+          </a:p>
+        </p:txBody>
+      </p:sp>
+    </p:spTree>
+    <p:extLst>
+      <p:ext uri="{BB962C8B-B14F-4D97-AF65-F5344CB8AC3E}">
+        <p14:creationId xmlns:p14="http://schemas.microsoft.com/office/powerpoint/2010/main" val="2445915657"/>
       </p:ext>
     </p:extLst>
   </p:cSld>
@@ -3407,6 +3614,113 @@
           <p:cNvPr id="2" name="Title 1">
             <a:extLst>
               <a:ext uri="{FF2B5EF4-FFF2-40B4-BE49-F238E27FC236}">
+                <a16:creationId xmlns:a16="http://schemas.microsoft.com/office/drawing/2014/main" id="{52F7682C-A323-4DDA-BB03-EED5F9F9306C}"/>
+              </a:ext>
+            </a:extLst>
+          </p:cNvPr>
+          <p:cNvSpPr>
+            <a:spLocks noGrp="1"/>
+          </p:cNvSpPr>
+          <p:nvPr>
+            <p:ph type="title"/>
+          </p:nvPr>
+        </p:nvSpPr>
+        <p:spPr/>
+        <p:txBody>
+          <a:bodyPr/>
+          <a:lstStyle/>
+          <a:p>
+            <a:r>
+              <a:rPr lang="en-US" dirty="0"/>
+              <a:t>Background</a:t>
+            </a:r>
+          </a:p>
+        </p:txBody>
+      </p:sp>
+      <p:sp>
+        <p:nvSpPr>
+          <p:cNvPr id="3" name="Content Placeholder 2">
+            <a:extLst>
+              <a:ext uri="{FF2B5EF4-FFF2-40B4-BE49-F238E27FC236}">
+                <a16:creationId xmlns:a16="http://schemas.microsoft.com/office/drawing/2014/main" id="{F85E33AD-E8E2-4008-A796-4270FF60182E}"/>
+              </a:ext>
+            </a:extLst>
+          </p:cNvPr>
+          <p:cNvSpPr>
+            <a:spLocks noGrp="1"/>
+          </p:cNvSpPr>
+          <p:nvPr>
+            <p:ph idx="1"/>
+          </p:nvPr>
+        </p:nvSpPr>
+        <p:spPr/>
+        <p:txBody>
+          <a:bodyPr/>
+          <a:lstStyle/>
+          <a:p>
+            <a:r>
+              <a:rPr lang="en-US" dirty="0"/>
+              <a:t>Town in the mid-west</a:t>
+            </a:r>
+          </a:p>
+          <a:p>
+            <a:r>
+              <a:rPr lang="en-US" dirty="0"/>
+              <a:t>Important for ____</a:t>
+            </a:r>
+          </a:p>
+          <a:p>
+            <a:r>
+              <a:rPr lang="en-US" dirty="0"/>
+              <a:t>Interesting because ___</a:t>
+            </a:r>
+          </a:p>
+          <a:p>
+            <a:r>
+              <a:rPr lang="en-US" dirty="0"/>
+              <a:t>Given raw data</a:t>
+            </a:r>
+          </a:p>
+          <a:p>
+            <a:endParaRPr lang="en-US" dirty="0"/>
+          </a:p>
+        </p:txBody>
+      </p:sp>
+    </p:spTree>
+    <p:extLst>
+      <p:ext uri="{BB962C8B-B14F-4D97-AF65-F5344CB8AC3E}">
+        <p14:creationId xmlns:p14="http://schemas.microsoft.com/office/powerpoint/2010/main" val="3684967107"/>
+      </p:ext>
+    </p:extLst>
+  </p:cSld>
+  <p:clrMapOvr>
+    <a:masterClrMapping/>
+  </p:clrMapOvr>
+</p:sld>
+</file>
+
+<file path=ppt/slides/slide3.xml><?xml version="1.0" encoding="utf-8"?>
+<p:sld xmlns:a="http://schemas.openxmlformats.org/drawingml/2006/main" xmlns:r="http://schemas.openxmlformats.org/officeDocument/2006/relationships" xmlns:p="http://schemas.openxmlformats.org/presentationml/2006/main">
+  <p:cSld>
+    <p:spTree>
+      <p:nvGrpSpPr>
+        <p:cNvPr id="1" name=""/>
+        <p:cNvGrpSpPr/>
+        <p:nvPr/>
+      </p:nvGrpSpPr>
+      <p:grpSpPr>
+        <a:xfrm>
+          <a:off x="0" y="0"/>
+          <a:ext cx="0" cy="0"/>
+          <a:chOff x="0" y="0"/>
+          <a:chExt cx="0" cy="0"/>
+        </a:xfrm>
+      </p:grpSpPr>
+      <p:sp>
+        <p:nvSpPr>
+          <p:cNvPr id="2" name="Title 1">
+            <a:extLst>
+              <a:ext uri="{FF2B5EF4-FFF2-40B4-BE49-F238E27FC236}">
                 <a16:creationId xmlns:a16="http://schemas.microsoft.com/office/drawing/2014/main" id="{C23EA3C6-36F4-439B-8FB0-462A26D0133F}"/>
               </a:ext>
             </a:extLst>
@@ -3430,12 +3744,303 @@
           </a:p>
         </p:txBody>
       </p:sp>
+      <p:sp>
+        <p:nvSpPr>
+          <p:cNvPr id="12" name="Oval 11">
+            <a:extLst>
+              <a:ext uri="{FF2B5EF4-FFF2-40B4-BE49-F238E27FC236}">
+                <a16:creationId xmlns:a16="http://schemas.microsoft.com/office/drawing/2014/main" id="{5A5E5405-084F-490F-A268-DA0BD23D023C}"/>
+              </a:ext>
+            </a:extLst>
+          </p:cNvPr>
+          <p:cNvSpPr/>
+          <p:nvPr/>
+        </p:nvSpPr>
+        <p:spPr>
+          <a:xfrm>
+            <a:off x="2333155" y="1791475"/>
+            <a:ext cx="2258179" cy="2258179"/>
+          </a:xfrm>
+          <a:prstGeom prst="ellipse">
+            <a:avLst/>
+          </a:prstGeom>
+        </p:spPr>
+        <p:style>
+          <a:lnRef idx="2">
+            <a:schemeClr val="accent1">
+              <a:shade val="50000"/>
+            </a:schemeClr>
+          </a:lnRef>
+          <a:fillRef idx="1">
+            <a:schemeClr val="accent1"/>
+          </a:fillRef>
+          <a:effectRef idx="0">
+            <a:schemeClr val="accent1"/>
+          </a:effectRef>
+          <a:fontRef idx="minor">
+            <a:schemeClr val="lt1"/>
+          </a:fontRef>
+        </p:style>
+        <p:txBody>
+          <a:bodyPr rtlCol="0" anchor="ctr"/>
+          <a:lstStyle/>
+          <a:p>
+            <a:pPr algn="ctr"/>
+            <a:r>
+              <a:rPr lang="en-US" b="1" dirty="0"/>
+              <a:t>Pool Quality</a:t>
+            </a:r>
+          </a:p>
+        </p:txBody>
+      </p:sp>
+      <p:sp>
+        <p:nvSpPr>
+          <p:cNvPr id="20" name="Oval 19">
+            <a:extLst>
+              <a:ext uri="{FF2B5EF4-FFF2-40B4-BE49-F238E27FC236}">
+                <a16:creationId xmlns:a16="http://schemas.microsoft.com/office/drawing/2014/main" id="{1409D937-C2E7-476B-BECC-BC06ACC57E12}"/>
+              </a:ext>
+            </a:extLst>
+          </p:cNvPr>
+          <p:cNvSpPr/>
+          <p:nvPr/>
+        </p:nvSpPr>
+        <p:spPr>
+          <a:xfrm>
+            <a:off x="1655270" y="4049654"/>
+            <a:ext cx="2017926" cy="2017926"/>
+          </a:xfrm>
+          <a:prstGeom prst="ellipse">
+            <a:avLst/>
+          </a:prstGeom>
+        </p:spPr>
+        <p:style>
+          <a:lnRef idx="2">
+            <a:schemeClr val="accent1">
+              <a:shade val="50000"/>
+            </a:schemeClr>
+          </a:lnRef>
+          <a:fillRef idx="1">
+            <a:schemeClr val="accent1"/>
+          </a:fillRef>
+          <a:effectRef idx="0">
+            <a:schemeClr val="accent1"/>
+          </a:effectRef>
+          <a:fontRef idx="minor">
+            <a:schemeClr val="lt1"/>
+          </a:fontRef>
+        </p:style>
+        <p:txBody>
+          <a:bodyPr rtlCol="0" anchor="ctr"/>
+          <a:lstStyle/>
+          <a:p>
+            <a:pPr algn="ctr"/>
+            <a:r>
+              <a:rPr lang="en-US" sz="1600" b="1" dirty="0"/>
+              <a:t>Miscellaneous Features</a:t>
+            </a:r>
+          </a:p>
+        </p:txBody>
+      </p:sp>
+      <p:sp>
+        <p:nvSpPr>
+          <p:cNvPr id="21" name="Oval 20">
+            <a:extLst>
+              <a:ext uri="{FF2B5EF4-FFF2-40B4-BE49-F238E27FC236}">
+                <a16:creationId xmlns:a16="http://schemas.microsoft.com/office/drawing/2014/main" id="{2E050221-4283-435F-B3E9-F58495CAED8E}"/>
+              </a:ext>
+            </a:extLst>
+          </p:cNvPr>
+          <p:cNvSpPr/>
+          <p:nvPr/>
+        </p:nvSpPr>
+        <p:spPr>
+          <a:xfrm>
+            <a:off x="4673604" y="1832024"/>
+            <a:ext cx="2017926" cy="2017926"/>
+          </a:xfrm>
+          <a:prstGeom prst="ellipse">
+            <a:avLst/>
+          </a:prstGeom>
+        </p:spPr>
+        <p:style>
+          <a:lnRef idx="2">
+            <a:schemeClr val="accent1">
+              <a:shade val="50000"/>
+            </a:schemeClr>
+          </a:lnRef>
+          <a:fillRef idx="1">
+            <a:schemeClr val="accent1"/>
+          </a:fillRef>
+          <a:effectRef idx="0">
+            <a:schemeClr val="accent1"/>
+          </a:effectRef>
+          <a:fontRef idx="minor">
+            <a:schemeClr val="lt1"/>
+          </a:fontRef>
+        </p:style>
+        <p:txBody>
+          <a:bodyPr rtlCol="0" anchor="ctr"/>
+          <a:lstStyle/>
+          <a:p>
+            <a:pPr algn="ctr"/>
+            <a:r>
+              <a:rPr lang="en-US" b="1" dirty="0"/>
+              <a:t>Alley</a:t>
+            </a:r>
+          </a:p>
+        </p:txBody>
+      </p:sp>
+      <p:sp>
+        <p:nvSpPr>
+          <p:cNvPr id="22" name="Oval 21">
+            <a:extLst>
+              <a:ext uri="{FF2B5EF4-FFF2-40B4-BE49-F238E27FC236}">
+                <a16:creationId xmlns:a16="http://schemas.microsoft.com/office/drawing/2014/main" id="{D198B45E-FBA7-49F6-BF76-AAD8A7411B83}"/>
+              </a:ext>
+            </a:extLst>
+          </p:cNvPr>
+          <p:cNvSpPr/>
+          <p:nvPr/>
+        </p:nvSpPr>
+        <p:spPr>
+          <a:xfrm>
+            <a:off x="3957649" y="3986586"/>
+            <a:ext cx="1649566" cy="1649566"/>
+          </a:xfrm>
+          <a:prstGeom prst="ellipse">
+            <a:avLst/>
+          </a:prstGeom>
+        </p:spPr>
+        <p:style>
+          <a:lnRef idx="2">
+            <a:schemeClr val="accent1">
+              <a:shade val="50000"/>
+            </a:schemeClr>
+          </a:lnRef>
+          <a:fillRef idx="1">
+            <a:schemeClr val="accent1"/>
+          </a:fillRef>
+          <a:effectRef idx="0">
+            <a:schemeClr val="accent1"/>
+          </a:effectRef>
+          <a:fontRef idx="minor">
+            <a:schemeClr val="lt1"/>
+          </a:fontRef>
+        </p:style>
+        <p:txBody>
+          <a:bodyPr rtlCol="0" anchor="ctr"/>
+          <a:lstStyle/>
+          <a:p>
+            <a:pPr algn="ctr"/>
+            <a:r>
+              <a:rPr lang="en-US" b="1" dirty="0"/>
+              <a:t>Fence</a:t>
+            </a:r>
+          </a:p>
+        </p:txBody>
+      </p:sp>
+      <p:sp>
+        <p:nvSpPr>
+          <p:cNvPr id="23" name="Oval 22">
+            <a:extLst>
+              <a:ext uri="{FF2B5EF4-FFF2-40B4-BE49-F238E27FC236}">
+                <a16:creationId xmlns:a16="http://schemas.microsoft.com/office/drawing/2014/main" id="{4B25B5FA-DC25-498C-8B89-8236162EC98A}"/>
+              </a:ext>
+            </a:extLst>
+          </p:cNvPr>
+          <p:cNvSpPr/>
+          <p:nvPr/>
+        </p:nvSpPr>
+        <p:spPr>
+          <a:xfrm>
+            <a:off x="5794506" y="4042324"/>
+            <a:ext cx="1193533" cy="1193533"/>
+          </a:xfrm>
+          <a:prstGeom prst="ellipse">
+            <a:avLst/>
+          </a:prstGeom>
+        </p:spPr>
+        <p:style>
+          <a:lnRef idx="2">
+            <a:schemeClr val="accent1">
+              <a:shade val="50000"/>
+            </a:schemeClr>
+          </a:lnRef>
+          <a:fillRef idx="1">
+            <a:schemeClr val="accent1"/>
+          </a:fillRef>
+          <a:effectRef idx="0">
+            <a:schemeClr val="accent1"/>
+          </a:effectRef>
+          <a:fontRef idx="minor">
+            <a:schemeClr val="lt1"/>
+          </a:fontRef>
+        </p:style>
+        <p:txBody>
+          <a:bodyPr rtlCol="0" anchor="ctr"/>
+          <a:lstStyle/>
+          <a:p>
+            <a:pPr algn="ctr"/>
+            <a:r>
+              <a:rPr lang="en-US" sz="1200" b="1" dirty="0"/>
+              <a:t>Fireplace</a:t>
+            </a:r>
+          </a:p>
+        </p:txBody>
+      </p:sp>
+      <p:sp>
+        <p:nvSpPr>
+          <p:cNvPr id="24" name="Oval 23">
+            <a:extLst>
+              <a:ext uri="{FF2B5EF4-FFF2-40B4-BE49-F238E27FC236}">
+                <a16:creationId xmlns:a16="http://schemas.microsoft.com/office/drawing/2014/main" id="{60F4FF96-0FEF-4CD1-9EF5-9BBC3DA1E50E}"/>
+              </a:ext>
+            </a:extLst>
+          </p:cNvPr>
+          <p:cNvSpPr/>
+          <p:nvPr/>
+        </p:nvSpPr>
+        <p:spPr>
+          <a:xfrm>
+            <a:off x="3644489" y="5579011"/>
+            <a:ext cx="665754" cy="665754"/>
+          </a:xfrm>
+          <a:prstGeom prst="ellipse">
+            <a:avLst/>
+          </a:prstGeom>
+        </p:spPr>
+        <p:style>
+          <a:lnRef idx="2">
+            <a:schemeClr val="accent1">
+              <a:shade val="50000"/>
+            </a:schemeClr>
+          </a:lnRef>
+          <a:fillRef idx="1">
+            <a:schemeClr val="accent1"/>
+          </a:fillRef>
+          <a:effectRef idx="0">
+            <a:schemeClr val="accent1"/>
+          </a:effectRef>
+          <a:fontRef idx="minor">
+            <a:schemeClr val="lt1"/>
+          </a:fontRef>
+        </p:style>
+        <p:txBody>
+          <a:bodyPr rtlCol="0" anchor="ctr"/>
+          <a:lstStyle/>
+          <a:p>
+            <a:pPr algn="ctr"/>
+            <a:endParaRPr lang="en-US" dirty="0"/>
+          </a:p>
+        </p:txBody>
+      </p:sp>
       <p:grpSp>
         <p:nvGrpSpPr>
-          <p:cNvPr id="14" name="Group 13">
-            <a:extLst>
-              <a:ext uri="{FF2B5EF4-FFF2-40B4-BE49-F238E27FC236}">
-                <a16:creationId xmlns:a16="http://schemas.microsoft.com/office/drawing/2014/main" id="{3AC7AF5C-2ED9-420E-AD1C-7ACB6789BF72}"/>
+          <p:cNvPr id="42" name="Group 41">
+            <a:extLst>
+              <a:ext uri="{FF2B5EF4-FFF2-40B4-BE49-F238E27FC236}">
+                <a16:creationId xmlns:a16="http://schemas.microsoft.com/office/drawing/2014/main" id="{EA98CA58-AC3B-4598-B719-3E21E9E7840E}"/>
               </a:ext>
             </a:extLst>
           </p:cNvPr>
@@ -3444,18 +4049,18 @@
         </p:nvGrpSpPr>
         <p:grpSpPr>
           <a:xfrm>
-            <a:off x="2850514" y="2277726"/>
-            <a:ext cx="6490971" cy="3818275"/>
-            <a:chOff x="1383880" y="2229600"/>
-            <a:chExt cx="6490971" cy="3818275"/>
+            <a:off x="6565231" y="4759140"/>
+            <a:ext cx="2834223" cy="1477328"/>
+            <a:chOff x="6612483" y="4298580"/>
+            <a:chExt cx="2834223" cy="1477328"/>
           </a:xfrm>
         </p:grpSpPr>
         <p:sp>
           <p:nvSpPr>
-            <p:cNvPr id="4" name="Oval 3">
+            <p:cNvPr id="10" name="Oval 9">
               <a:extLst>
                 <a:ext uri="{FF2B5EF4-FFF2-40B4-BE49-F238E27FC236}">
-                  <a16:creationId xmlns:a16="http://schemas.microsoft.com/office/drawing/2014/main" id="{616F9F90-3C2B-42E0-8FD7-09721964AC36}"/>
+                  <a16:creationId xmlns:a16="http://schemas.microsoft.com/office/drawing/2014/main" id="{3EBA2FBD-E0F5-4DEA-A94D-21D08F07F8A9}"/>
                 </a:ext>
               </a:extLst>
             </p:cNvPr>
@@ -3464,8 +4069,8 @@
           </p:nvSpPr>
           <p:spPr>
             <a:xfrm>
-              <a:off x="5258039" y="3383381"/>
-              <a:ext cx="1014667" cy="1014667"/>
+              <a:off x="6612483" y="5089118"/>
+              <a:ext cx="276727" cy="276727"/>
             </a:xfrm>
             <a:prstGeom prst="ellipse">
               <a:avLst/>
@@ -3498,10 +4103,10 @@
         </p:sp>
         <p:sp>
           <p:nvSpPr>
-            <p:cNvPr id="5" name="Oval 4">
+            <p:cNvPr id="26" name="Oval 25">
               <a:extLst>
                 <a:ext uri="{FF2B5EF4-FFF2-40B4-BE49-F238E27FC236}">
-                  <a16:creationId xmlns:a16="http://schemas.microsoft.com/office/drawing/2014/main" id="{D24F3B94-988A-4A64-825B-BF899A0945BD}"/>
+                  <a16:creationId xmlns:a16="http://schemas.microsoft.com/office/drawing/2014/main" id="{BDFDAF62-AC54-43C6-A61C-D86F2A16FCC3}"/>
                 </a:ext>
               </a:extLst>
             </p:cNvPr>
@@ -3510,8 +4115,8 @@
           </p:nvSpPr>
           <p:spPr>
             <a:xfrm>
-              <a:off x="4900984" y="2265069"/>
-              <a:ext cx="914400" cy="914400"/>
+              <a:off x="7007839" y="4736560"/>
+              <a:ext cx="276727" cy="276727"/>
             </a:xfrm>
             <a:prstGeom prst="ellipse">
               <a:avLst/>
@@ -3544,10 +4149,10 @@
         </p:sp>
         <p:sp>
           <p:nvSpPr>
-            <p:cNvPr id="6" name="Oval 5">
+            <p:cNvPr id="27" name="Oval 26">
               <a:extLst>
                 <a:ext uri="{FF2B5EF4-FFF2-40B4-BE49-F238E27FC236}">
-                  <a16:creationId xmlns:a16="http://schemas.microsoft.com/office/drawing/2014/main" id="{E95FAF39-7742-4246-800B-8DB76EFB9809}"/>
+                  <a16:creationId xmlns:a16="http://schemas.microsoft.com/office/drawing/2014/main" id="{FB9C08E6-0F03-4410-80A1-1A08DBB28EF7}"/>
                 </a:ext>
               </a:extLst>
             </p:cNvPr>
@@ -3556,8 +4161,8 @@
           </p:nvSpPr>
           <p:spPr>
             <a:xfrm>
-              <a:off x="6119058" y="2688550"/>
-              <a:ext cx="557209" cy="557209"/>
+              <a:off x="7434792" y="4723317"/>
+              <a:ext cx="276727" cy="276727"/>
             </a:xfrm>
             <a:prstGeom prst="ellipse">
               <a:avLst/>
@@ -3590,6 +4195,194 @@
         </p:sp>
         <p:sp>
           <p:nvSpPr>
+            <p:cNvPr id="28" name="Oval 27">
+              <a:extLst>
+                <a:ext uri="{FF2B5EF4-FFF2-40B4-BE49-F238E27FC236}">
+                  <a16:creationId xmlns:a16="http://schemas.microsoft.com/office/drawing/2014/main" id="{65F181DB-F184-437A-B877-AFBA065FEA58}"/>
+                </a:ext>
+              </a:extLst>
+            </p:cNvPr>
+            <p:cNvSpPr/>
+            <p:nvPr/>
+          </p:nvSpPr>
+          <p:spPr>
+            <a:xfrm>
+              <a:off x="7200194" y="4353985"/>
+              <a:ext cx="276727" cy="276727"/>
+            </a:xfrm>
+            <a:prstGeom prst="ellipse">
+              <a:avLst/>
+            </a:prstGeom>
+          </p:spPr>
+          <p:style>
+            <a:lnRef idx="2">
+              <a:schemeClr val="accent1">
+                <a:shade val="50000"/>
+              </a:schemeClr>
+            </a:lnRef>
+            <a:fillRef idx="1">
+              <a:schemeClr val="accent1"/>
+            </a:fillRef>
+            <a:effectRef idx="0">
+              <a:schemeClr val="accent1"/>
+            </a:effectRef>
+            <a:fontRef idx="minor">
+              <a:schemeClr val="lt1"/>
+            </a:fontRef>
+          </p:style>
+          <p:txBody>
+            <a:bodyPr rtlCol="0" anchor="ctr"/>
+            <a:lstStyle/>
+            <a:p>
+              <a:pPr algn="ctr"/>
+              <a:endParaRPr lang="en-US"/>
+            </a:p>
+          </p:txBody>
+        </p:sp>
+        <p:sp>
+          <p:nvSpPr>
+            <p:cNvPr id="29" name="Oval 28">
+              <a:extLst>
+                <a:ext uri="{FF2B5EF4-FFF2-40B4-BE49-F238E27FC236}">
+                  <a16:creationId xmlns:a16="http://schemas.microsoft.com/office/drawing/2014/main" id="{EAA32D55-A2D8-47D0-903E-9F5A9BEA4287}"/>
+                </a:ext>
+              </a:extLst>
+            </p:cNvPr>
+            <p:cNvSpPr/>
+            <p:nvPr/>
+          </p:nvSpPr>
+          <p:spPr>
+            <a:xfrm>
+              <a:off x="7166385" y="5150955"/>
+              <a:ext cx="276727" cy="276727"/>
+            </a:xfrm>
+            <a:prstGeom prst="ellipse">
+              <a:avLst/>
+            </a:prstGeom>
+          </p:spPr>
+          <p:style>
+            <a:lnRef idx="2">
+              <a:schemeClr val="accent1">
+                <a:shade val="50000"/>
+              </a:schemeClr>
+            </a:lnRef>
+            <a:fillRef idx="1">
+              <a:schemeClr val="accent1"/>
+            </a:fillRef>
+            <a:effectRef idx="0">
+              <a:schemeClr val="accent1"/>
+            </a:effectRef>
+            <a:fontRef idx="minor">
+              <a:schemeClr val="lt1"/>
+            </a:fontRef>
+          </p:style>
+          <p:txBody>
+            <a:bodyPr rtlCol="0" anchor="ctr"/>
+            <a:lstStyle/>
+            <a:p>
+              <a:pPr algn="ctr"/>
+              <a:endParaRPr lang="en-US"/>
+            </a:p>
+          </p:txBody>
+        </p:sp>
+        <p:sp>
+          <p:nvSpPr>
+            <p:cNvPr id="3" name="TextBox 2">
+              <a:extLst>
+                <a:ext uri="{FF2B5EF4-FFF2-40B4-BE49-F238E27FC236}">
+                  <a16:creationId xmlns:a16="http://schemas.microsoft.com/office/drawing/2014/main" id="{873A0B50-8C82-482C-9C8A-F0790870F012}"/>
+                </a:ext>
+              </a:extLst>
+            </p:cNvPr>
+            <p:cNvSpPr txBox="1"/>
+            <p:nvPr/>
+          </p:nvSpPr>
+          <p:spPr>
+            <a:xfrm>
+              <a:off x="7842613" y="4298580"/>
+              <a:ext cx="1604093" cy="1477328"/>
+            </a:xfrm>
+            <a:prstGeom prst="rect">
+              <a:avLst/>
+            </a:prstGeom>
+            <a:noFill/>
+          </p:spPr>
+          <p:txBody>
+            <a:bodyPr wrap="none" rtlCol="0">
+              <a:spAutoFit/>
+            </a:bodyPr>
+            <a:lstStyle/>
+            <a:p>
+              <a:r>
+                <a:rPr lang="en-US" dirty="0"/>
+                <a:t>Basements</a:t>
+              </a:r>
+            </a:p>
+            <a:p>
+              <a:pPr marL="285750" indent="-285750">
+                <a:buFontTx/>
+                <a:buChar char="-"/>
+              </a:pPr>
+              <a:r>
+                <a:rPr lang="en-US" dirty="0"/>
+                <a:t>Exposure</a:t>
+              </a:r>
+            </a:p>
+            <a:p>
+              <a:pPr marL="285750" indent="-285750">
+                <a:buFontTx/>
+                <a:buChar char="-"/>
+              </a:pPr>
+              <a:r>
+                <a:rPr lang="en-US" dirty="0"/>
+                <a:t>Finish Types</a:t>
+              </a:r>
+            </a:p>
+            <a:p>
+              <a:pPr marL="285750" indent="-285750">
+                <a:buFontTx/>
+                <a:buChar char="-"/>
+              </a:pPr>
+              <a:r>
+                <a:rPr lang="en-US" dirty="0"/>
+                <a:t>Condition </a:t>
+              </a:r>
+            </a:p>
+            <a:p>
+              <a:pPr marL="285750" indent="-285750">
+                <a:buFontTx/>
+                <a:buChar char="-"/>
+              </a:pPr>
+              <a:r>
+                <a:rPr lang="en-US" dirty="0"/>
+                <a:t>Quality</a:t>
+              </a:r>
+            </a:p>
+          </p:txBody>
+        </p:sp>
+      </p:grpSp>
+      <p:grpSp>
+        <p:nvGrpSpPr>
+          <p:cNvPr id="43" name="Group 42">
+            <a:extLst>
+              <a:ext uri="{FF2B5EF4-FFF2-40B4-BE49-F238E27FC236}">
+                <a16:creationId xmlns:a16="http://schemas.microsoft.com/office/drawing/2014/main" id="{129CED43-560C-40EA-A1F4-8113454437B3}"/>
+              </a:ext>
+            </a:extLst>
+          </p:cNvPr>
+          <p:cNvGrpSpPr/>
+          <p:nvPr/>
+        </p:nvGrpSpPr>
+        <p:grpSpPr>
+          <a:xfrm>
+            <a:off x="6625354" y="1625585"/>
+            <a:ext cx="2439341" cy="1754326"/>
+            <a:chOff x="6156123" y="1556715"/>
+            <a:chExt cx="2439341" cy="1754326"/>
+          </a:xfrm>
+        </p:grpSpPr>
+        <p:sp>
+          <p:nvSpPr>
             <p:cNvPr id="7" name="Oval 6">
               <a:extLst>
                 <a:ext uri="{FF2B5EF4-FFF2-40B4-BE49-F238E27FC236}">
@@ -3602,8 +4395,8 @@
           </p:nvSpPr>
           <p:spPr>
             <a:xfrm>
-              <a:off x="7509893" y="5504190"/>
-              <a:ext cx="276727" cy="276727"/>
+              <a:off x="6398777" y="2161717"/>
+              <a:ext cx="405321" cy="405321"/>
             </a:xfrm>
             <a:prstGeom prst="ellipse">
               <a:avLst/>
@@ -3648,8 +4441,8 @@
           </p:nvSpPr>
           <p:spPr>
             <a:xfrm>
-              <a:off x="6725832" y="5642554"/>
-              <a:ext cx="276727" cy="276727"/>
+              <a:off x="6358784" y="2772465"/>
+              <a:ext cx="405321" cy="405321"/>
             </a:xfrm>
             <a:prstGeom prst="ellipse">
               <a:avLst/>
@@ -3694,8 +4487,8 @@
           </p:nvSpPr>
           <p:spPr>
             <a:xfrm>
-              <a:off x="7106832" y="5134481"/>
-              <a:ext cx="276727" cy="276727"/>
+              <a:off x="6156123" y="1680125"/>
+              <a:ext cx="405321" cy="405321"/>
             </a:xfrm>
             <a:prstGeom prst="ellipse">
               <a:avLst/>
@@ -3728,10 +4521,10 @@
         </p:sp>
         <p:sp>
           <p:nvSpPr>
-            <p:cNvPr id="10" name="Oval 9">
+            <p:cNvPr id="25" name="Oval 24">
               <a:extLst>
                 <a:ext uri="{FF2B5EF4-FFF2-40B4-BE49-F238E27FC236}">
-                  <a16:creationId xmlns:a16="http://schemas.microsoft.com/office/drawing/2014/main" id="{3EBA2FBD-E0F5-4DEA-A94D-21D08F07F8A9}"/>
+                  <a16:creationId xmlns:a16="http://schemas.microsoft.com/office/drawing/2014/main" id="{722787D5-AB68-43CF-B5D7-131719B67FD4}"/>
                 </a:ext>
               </a:extLst>
             </p:cNvPr>
@@ -3740,8 +4533,8 @@
           </p:nvSpPr>
           <p:spPr>
             <a:xfrm>
-              <a:off x="7598124" y="4857754"/>
-              <a:ext cx="276727" cy="276727"/>
+              <a:off x="6715648" y="1625695"/>
+              <a:ext cx="405321" cy="405321"/>
             </a:xfrm>
             <a:prstGeom prst="ellipse">
               <a:avLst/>
@@ -3774,10 +4567,151 @@
         </p:sp>
         <p:sp>
           <p:nvSpPr>
-            <p:cNvPr id="11" name="Oval 10">
+            <p:cNvPr id="31" name="TextBox 30">
               <a:extLst>
                 <a:ext uri="{FF2B5EF4-FFF2-40B4-BE49-F238E27FC236}">
-                  <a16:creationId xmlns:a16="http://schemas.microsoft.com/office/drawing/2014/main" id="{37B138C9-E9CD-4947-A1B2-E793DC1D580C}"/>
+                  <a16:creationId xmlns:a16="http://schemas.microsoft.com/office/drawing/2014/main" id="{B5D7594A-4395-403E-966A-814839A66C67}"/>
+                </a:ext>
+              </a:extLst>
+            </p:cNvPr>
+            <p:cNvSpPr txBox="1"/>
+            <p:nvPr/>
+          </p:nvSpPr>
+          <p:spPr>
+            <a:xfrm>
+              <a:off x="7206942" y="1556715"/>
+              <a:ext cx="1388522" cy="1754326"/>
+            </a:xfrm>
+            <a:prstGeom prst="rect">
+              <a:avLst/>
+            </a:prstGeom>
+            <a:noFill/>
+          </p:spPr>
+          <p:txBody>
+            <a:bodyPr wrap="none" rtlCol="0">
+              <a:spAutoFit/>
+            </a:bodyPr>
+            <a:lstStyle/>
+            <a:p>
+              <a:r>
+                <a:rPr lang="en-US" dirty="0"/>
+                <a:t>Garage</a:t>
+              </a:r>
+            </a:p>
+            <a:p>
+              <a:pPr marL="285750" indent="-285750">
+                <a:buFontTx/>
+                <a:buChar char="-"/>
+              </a:pPr>
+              <a:r>
+                <a:rPr lang="en-US" dirty="0"/>
+                <a:t>Type </a:t>
+              </a:r>
+            </a:p>
+            <a:p>
+              <a:pPr marL="285750" indent="-285750">
+                <a:buFontTx/>
+                <a:buChar char="-"/>
+              </a:pPr>
+              <a:r>
+                <a:rPr lang="en-US" dirty="0"/>
+                <a:t>Year Built</a:t>
+              </a:r>
+            </a:p>
+            <a:p>
+              <a:pPr marL="285750" indent="-285750">
+                <a:buFontTx/>
+                <a:buChar char="-"/>
+              </a:pPr>
+              <a:r>
+                <a:rPr lang="en-US" dirty="0"/>
+                <a:t>Finish</a:t>
+              </a:r>
+            </a:p>
+            <a:p>
+              <a:pPr marL="285750" indent="-285750">
+                <a:buFontTx/>
+                <a:buChar char="-"/>
+              </a:pPr>
+              <a:r>
+                <a:rPr lang="en-US" dirty="0"/>
+                <a:t>Condition</a:t>
+              </a:r>
+            </a:p>
+            <a:p>
+              <a:pPr marL="285750" indent="-285750">
+                <a:buFontTx/>
+                <a:buChar char="-"/>
+              </a:pPr>
+              <a:r>
+                <a:rPr lang="en-US" dirty="0"/>
+                <a:t>Quality</a:t>
+              </a:r>
+            </a:p>
+          </p:txBody>
+        </p:sp>
+      </p:grpSp>
+      <p:sp>
+        <p:nvSpPr>
+          <p:cNvPr id="32" name="TextBox 31">
+            <a:extLst>
+              <a:ext uri="{FF2B5EF4-FFF2-40B4-BE49-F238E27FC236}">
+                <a16:creationId xmlns:a16="http://schemas.microsoft.com/office/drawing/2014/main" id="{16A4ED35-8CF4-4D29-8C9D-53E8DB38F29C}"/>
+              </a:ext>
+            </a:extLst>
+          </p:cNvPr>
+          <p:cNvSpPr txBox="1"/>
+          <p:nvPr/>
+        </p:nvSpPr>
+        <p:spPr>
+          <a:xfrm>
+            <a:off x="4276171" y="6092016"/>
+            <a:ext cx="1365117" cy="369332"/>
+          </a:xfrm>
+          <a:prstGeom prst="rect">
+            <a:avLst/>
+          </a:prstGeom>
+          <a:noFill/>
+        </p:spPr>
+        <p:txBody>
+          <a:bodyPr wrap="none" rtlCol="0">
+            <a:spAutoFit/>
+          </a:bodyPr>
+          <a:lstStyle/>
+          <a:p>
+            <a:r>
+              <a:rPr lang="en-US" dirty="0"/>
+              <a:t>Lot Frontage</a:t>
+            </a:r>
+          </a:p>
+        </p:txBody>
+      </p:sp>
+      <p:grpSp>
+        <p:nvGrpSpPr>
+          <p:cNvPr id="41" name="Group 40">
+            <a:extLst>
+              <a:ext uri="{FF2B5EF4-FFF2-40B4-BE49-F238E27FC236}">
+                <a16:creationId xmlns:a16="http://schemas.microsoft.com/office/drawing/2014/main" id="{23B7838F-96B6-4904-B425-042E4505B26D}"/>
+              </a:ext>
+            </a:extLst>
+          </p:cNvPr>
+          <p:cNvGrpSpPr/>
+          <p:nvPr/>
+        </p:nvGrpSpPr>
+        <p:grpSpPr>
+          <a:xfrm>
+            <a:off x="6960587" y="3637715"/>
+            <a:ext cx="3504379" cy="738664"/>
+            <a:chOff x="7803431" y="3557674"/>
+            <a:chExt cx="3504379" cy="738664"/>
+          </a:xfrm>
+        </p:grpSpPr>
+        <p:sp>
+          <p:nvSpPr>
+            <p:cNvPr id="33" name="Oval 32">
+              <a:extLst>
+                <a:ext uri="{FF2B5EF4-FFF2-40B4-BE49-F238E27FC236}">
+                  <a16:creationId xmlns:a16="http://schemas.microsoft.com/office/drawing/2014/main" id="{3C096D6B-B704-4651-A5AA-DAC9A7F2D019}"/>
                 </a:ext>
               </a:extLst>
             </p:cNvPr>
@@ -3786,8 +4720,8 @@
           </p:nvSpPr>
           <p:spPr>
             <a:xfrm>
-              <a:off x="5192865" y="4668250"/>
-              <a:ext cx="1379625" cy="1379625"/>
+              <a:off x="7803431" y="3654776"/>
+              <a:ext cx="190049" cy="190049"/>
             </a:xfrm>
             <a:prstGeom prst="ellipse">
               <a:avLst/>
@@ -3820,10 +4754,10 @@
         </p:sp>
         <p:sp>
           <p:nvSpPr>
-            <p:cNvPr id="12" name="Oval 11">
+            <p:cNvPr id="34" name="Oval 33">
               <a:extLst>
                 <a:ext uri="{FF2B5EF4-FFF2-40B4-BE49-F238E27FC236}">
-                  <a16:creationId xmlns:a16="http://schemas.microsoft.com/office/drawing/2014/main" id="{5A5E5405-084F-490F-A268-DA0BD23D023C}"/>
+                  <a16:creationId xmlns:a16="http://schemas.microsoft.com/office/drawing/2014/main" id="{3F735BBE-59B6-4898-B84C-7E391B4099BB}"/>
                 </a:ext>
               </a:extLst>
             </p:cNvPr>
@@ -3832,8 +4766,8 @@
           </p:nvSpPr>
           <p:spPr>
             <a:xfrm>
-              <a:off x="1383880" y="2229600"/>
-              <a:ext cx="3709736" cy="3709736"/>
+              <a:off x="8080159" y="3661863"/>
+              <a:ext cx="190049" cy="190049"/>
             </a:xfrm>
             <a:prstGeom prst="ellipse">
               <a:avLst/>
@@ -3860,16 +4794,16 @@
             <a:lstStyle/>
             <a:p>
               <a:pPr algn="ctr"/>
-              <a:endParaRPr lang="en-US"/>
+              <a:endParaRPr lang="en-US" dirty="0"/>
             </a:p>
           </p:txBody>
         </p:sp>
         <p:sp>
           <p:nvSpPr>
-            <p:cNvPr id="13" name="Oval 12">
+            <p:cNvPr id="35" name="Oval 34">
               <a:extLst>
                 <a:ext uri="{FF2B5EF4-FFF2-40B4-BE49-F238E27FC236}">
-                  <a16:creationId xmlns:a16="http://schemas.microsoft.com/office/drawing/2014/main" id="{15C4E6FC-596E-4AE9-9ACF-AA5EAFAA13D6}"/>
+                  <a16:creationId xmlns:a16="http://schemas.microsoft.com/office/drawing/2014/main" id="{6B2F6F27-46F2-4071-A8CA-9EA997992CAE}"/>
                 </a:ext>
               </a:extLst>
             </p:cNvPr>
@@ -3878,8 +4812,8 @@
           </p:nvSpPr>
           <p:spPr>
             <a:xfrm>
-              <a:off x="6495226" y="3843833"/>
-              <a:ext cx="1014667" cy="1014667"/>
+              <a:off x="8048576" y="3973454"/>
+              <a:ext cx="190049" cy="190049"/>
             </a:xfrm>
             <a:prstGeom prst="ellipse">
               <a:avLst/>
@@ -3906,17 +4840,87 @@
             <a:lstStyle/>
             <a:p>
               <a:pPr algn="ctr"/>
-              <a:endParaRPr lang="en-US"/>
+              <a:endParaRPr lang="en-US" dirty="0"/>
+            </a:p>
+          </p:txBody>
+        </p:sp>
+        <p:sp>
+          <p:nvSpPr>
+            <p:cNvPr id="37" name="TextBox 36">
+              <a:extLst>
+                <a:ext uri="{FF2B5EF4-FFF2-40B4-BE49-F238E27FC236}">
+                  <a16:creationId xmlns:a16="http://schemas.microsoft.com/office/drawing/2014/main" id="{F1E49765-7824-4FDD-8DF5-6EE9411DE270}"/>
+                </a:ext>
+              </a:extLst>
+            </p:cNvPr>
+            <p:cNvSpPr txBox="1"/>
+            <p:nvPr/>
+          </p:nvSpPr>
+          <p:spPr>
+            <a:xfrm>
+              <a:off x="8380149" y="3557674"/>
+              <a:ext cx="2927661" cy="369332"/>
+            </a:xfrm>
+            <a:prstGeom prst="rect">
+              <a:avLst/>
+            </a:prstGeom>
+            <a:noFill/>
+          </p:spPr>
+          <p:txBody>
+            <a:bodyPr wrap="none" rtlCol="0">
+              <a:spAutoFit/>
+            </a:bodyPr>
+            <a:lstStyle/>
+            <a:p>
+              <a:r>
+                <a:rPr lang="en-US" dirty="0"/>
+                <a:t>Masonry Veneer Area &amp; Type</a:t>
+              </a:r>
+            </a:p>
+          </p:txBody>
+        </p:sp>
+        <p:sp>
+          <p:nvSpPr>
+            <p:cNvPr id="40" name="TextBox 39">
+              <a:extLst>
+                <a:ext uri="{FF2B5EF4-FFF2-40B4-BE49-F238E27FC236}">
+                  <a16:creationId xmlns:a16="http://schemas.microsoft.com/office/drawing/2014/main" id="{0D9F60A0-89B2-4CEA-82DB-556E2A1456FD}"/>
+                </a:ext>
+              </a:extLst>
+            </p:cNvPr>
+            <p:cNvSpPr txBox="1"/>
+            <p:nvPr/>
+          </p:nvSpPr>
+          <p:spPr>
+            <a:xfrm>
+              <a:off x="8381958" y="3927006"/>
+              <a:ext cx="1032334" cy="369332"/>
+            </a:xfrm>
+            <a:prstGeom prst="rect">
+              <a:avLst/>
+            </a:prstGeom>
+            <a:noFill/>
+          </p:spPr>
+          <p:txBody>
+            <a:bodyPr wrap="none" rtlCol="0">
+              <a:spAutoFit/>
+            </a:bodyPr>
+            <a:lstStyle/>
+            <a:p>
+              <a:r>
+                <a:rPr lang="en-US" dirty="0"/>
+                <a:t>Electrical</a:t>
+              </a:r>
             </a:p>
           </p:txBody>
         </p:sp>
       </p:grpSp>
       <p:sp>
         <p:nvSpPr>
-          <p:cNvPr id="15" name="TextBox 14">
-            <a:extLst>
-              <a:ext uri="{FF2B5EF4-FFF2-40B4-BE49-F238E27FC236}">
-                <a16:creationId xmlns:a16="http://schemas.microsoft.com/office/drawing/2014/main" id="{DE1BF7F5-C257-4330-9EFA-5A1999AD075D}"/>
+          <p:cNvPr id="30" name="TextBox 29">
+            <a:extLst>
+              <a:ext uri="{FF2B5EF4-FFF2-40B4-BE49-F238E27FC236}">
+                <a16:creationId xmlns:a16="http://schemas.microsoft.com/office/drawing/2014/main" id="{DA138C47-5218-4D13-A23A-41FF1D9053C8}"/>
               </a:ext>
             </a:extLst>
           </p:cNvPr>
@@ -3925,8 +4929,8 @@
         </p:nvSpPr>
         <p:spPr>
           <a:xfrm>
-            <a:off x="1943673" y="2744286"/>
-            <a:ext cx="927049" cy="369332"/>
+            <a:off x="578466" y="6461348"/>
+            <a:ext cx="1615442" cy="369332"/>
           </a:xfrm>
           <a:prstGeom prst="rect">
             <a:avLst/>
@@ -3941,147 +4945,7 @@
           <a:p>
             <a:r>
               <a:rPr lang="en-US" dirty="0"/>
-              <a:t>Pool QC</a:t>
-            </a:r>
-          </a:p>
-        </p:txBody>
-      </p:sp>
-      <p:sp>
-        <p:nvSpPr>
-          <p:cNvPr id="16" name="TextBox 15">
-            <a:extLst>
-              <a:ext uri="{FF2B5EF4-FFF2-40B4-BE49-F238E27FC236}">
-                <a16:creationId xmlns:a16="http://schemas.microsoft.com/office/drawing/2014/main" id="{DF6858A1-F085-4BD6-AEEB-C40EBF2BB6B4}"/>
-              </a:ext>
-            </a:extLst>
-          </p:cNvPr>
-          <p:cNvSpPr txBox="1"/>
-          <p:nvPr/>
-        </p:nvSpPr>
-        <p:spPr>
-          <a:xfrm>
-            <a:off x="7111105" y="1828310"/>
-            <a:ext cx="702436" cy="369332"/>
-          </a:xfrm>
-          <a:prstGeom prst="rect">
-            <a:avLst/>
-          </a:prstGeom>
-          <a:noFill/>
-        </p:spPr>
-        <p:txBody>
-          <a:bodyPr wrap="none" rtlCol="0">
-            <a:spAutoFit/>
-          </a:bodyPr>
-          <a:lstStyle/>
-          <a:p>
-            <a:r>
-              <a:rPr lang="en-US" dirty="0"/>
-              <a:t>Thing</a:t>
-            </a:r>
-          </a:p>
-        </p:txBody>
-      </p:sp>
-      <p:sp>
-        <p:nvSpPr>
-          <p:cNvPr id="17" name="TextBox 16">
-            <a:extLst>
-              <a:ext uri="{FF2B5EF4-FFF2-40B4-BE49-F238E27FC236}">
-                <a16:creationId xmlns:a16="http://schemas.microsoft.com/office/drawing/2014/main" id="{F81C5B9A-7F02-47C7-A744-EDFC2D60232E}"/>
-              </a:ext>
-            </a:extLst>
-          </p:cNvPr>
-          <p:cNvSpPr txBox="1"/>
-          <p:nvPr/>
-        </p:nvSpPr>
-        <p:spPr>
-          <a:xfrm>
-            <a:off x="8164835" y="2367344"/>
-            <a:ext cx="702436" cy="369332"/>
-          </a:xfrm>
-          <a:prstGeom prst="rect">
-            <a:avLst/>
-          </a:prstGeom>
-          <a:noFill/>
-        </p:spPr>
-        <p:txBody>
-          <a:bodyPr wrap="none" rtlCol="0">
-            <a:spAutoFit/>
-          </a:bodyPr>
-          <a:lstStyle/>
-          <a:p>
-            <a:r>
-              <a:rPr lang="en-US" dirty="0"/>
-              <a:t>Thing</a:t>
-            </a:r>
-          </a:p>
-        </p:txBody>
-      </p:sp>
-      <p:sp>
-        <p:nvSpPr>
-          <p:cNvPr id="18" name="TextBox 17">
-            <a:extLst>
-              <a:ext uri="{FF2B5EF4-FFF2-40B4-BE49-F238E27FC236}">
-                <a16:creationId xmlns:a16="http://schemas.microsoft.com/office/drawing/2014/main" id="{8ACBAF10-E9E3-4790-B583-6517A86B292F}"/>
-              </a:ext>
-            </a:extLst>
-          </p:cNvPr>
-          <p:cNvSpPr txBox="1"/>
-          <p:nvPr/>
-        </p:nvSpPr>
-        <p:spPr>
-          <a:xfrm>
-            <a:off x="6473600" y="6218515"/>
-            <a:ext cx="702436" cy="369332"/>
-          </a:xfrm>
-          <a:prstGeom prst="rect">
-            <a:avLst/>
-          </a:prstGeom>
-          <a:noFill/>
-        </p:spPr>
-        <p:txBody>
-          <a:bodyPr wrap="none" rtlCol="0">
-            <a:spAutoFit/>
-          </a:bodyPr>
-          <a:lstStyle/>
-          <a:p>
-            <a:r>
-              <a:rPr lang="en-US" dirty="0"/>
-              <a:t>Thing</a:t>
-            </a:r>
-          </a:p>
-        </p:txBody>
-      </p:sp>
-      <p:sp>
-        <p:nvSpPr>
-          <p:cNvPr id="19" name="TextBox 18">
-            <a:extLst>
-              <a:ext uri="{FF2B5EF4-FFF2-40B4-BE49-F238E27FC236}">
-                <a16:creationId xmlns:a16="http://schemas.microsoft.com/office/drawing/2014/main" id="{9AF0254E-A39F-4317-B619-7B56DF4E26E8}"/>
-              </a:ext>
-            </a:extLst>
-          </p:cNvPr>
-          <p:cNvSpPr txBox="1"/>
-          <p:nvPr/>
-        </p:nvSpPr>
-        <p:spPr>
-          <a:xfrm>
-            <a:off x="9041701" y="3707293"/>
-            <a:ext cx="702436" cy="369332"/>
-          </a:xfrm>
-          <a:prstGeom prst="rect">
-            <a:avLst/>
-          </a:prstGeom>
-          <a:noFill/>
-        </p:spPr>
-        <p:txBody>
-          <a:bodyPr wrap="none" rtlCol="0">
-            <a:spAutoFit/>
-          </a:bodyPr>
-          <a:lstStyle/>
-          <a:p>
-            <a:r>
-              <a:rPr lang="en-US" dirty="0"/>
-              <a:t>Thing</a:t>
+              <a:t>* Relative scale</a:t>
             </a:r>
           </a:p>
         </p:txBody>
@@ -4089,7 +4953,545 @@
     </p:spTree>
     <p:extLst>
       <p:ext uri="{BB962C8B-B14F-4D97-AF65-F5344CB8AC3E}">
-        <p14:creationId xmlns:p14="http://schemas.microsoft.com/office/powerpoint/2010/main" val="2397737456"/>
+        <p14:creationId xmlns:p14="http://schemas.microsoft.com/office/powerpoint/2010/main" val="740845479"/>
+      </p:ext>
+    </p:extLst>
+  </p:cSld>
+  <p:clrMapOvr>
+    <a:masterClrMapping/>
+  </p:clrMapOvr>
+</p:sld>
+</file>
+
+<file path=ppt/slides/slide4.xml><?xml version="1.0" encoding="utf-8"?>
+<p:sld xmlns:a="http://schemas.openxmlformats.org/drawingml/2006/main" xmlns:r="http://schemas.openxmlformats.org/officeDocument/2006/relationships" xmlns:p="http://schemas.openxmlformats.org/presentationml/2006/main">
+  <p:cSld>
+    <p:spTree>
+      <p:nvGrpSpPr>
+        <p:cNvPr id="1" name=""/>
+        <p:cNvGrpSpPr/>
+        <p:nvPr/>
+      </p:nvGrpSpPr>
+      <p:grpSpPr>
+        <a:xfrm>
+          <a:off x="0" y="0"/>
+          <a:ext cx="0" cy="0"/>
+          <a:chOff x="0" y="0"/>
+          <a:chExt cx="0" cy="0"/>
+        </a:xfrm>
+      </p:grpSpPr>
+      <p:sp>
+        <p:nvSpPr>
+          <p:cNvPr id="2" name="Title 1">
+            <a:extLst>
+              <a:ext uri="{FF2B5EF4-FFF2-40B4-BE49-F238E27FC236}">
+                <a16:creationId xmlns:a16="http://schemas.microsoft.com/office/drawing/2014/main" id="{74500EBA-5936-4030-B3AD-039DFDD37E45}"/>
+              </a:ext>
+            </a:extLst>
+          </p:cNvPr>
+          <p:cNvSpPr>
+            <a:spLocks noGrp="1"/>
+          </p:cNvSpPr>
+          <p:nvPr>
+            <p:ph type="title"/>
+          </p:nvPr>
+        </p:nvSpPr>
+        <p:spPr/>
+        <p:txBody>
+          <a:bodyPr/>
+          <a:lstStyle/>
+          <a:p>
+            <a:r>
+              <a:rPr lang="en-US" dirty="0"/>
+              <a:t>Things you’d expect to be important</a:t>
+            </a:r>
+          </a:p>
+        </p:txBody>
+      </p:sp>
+      <p:sp>
+        <p:nvSpPr>
+          <p:cNvPr id="3" name="Content Placeholder 2">
+            <a:extLst>
+              <a:ext uri="{FF2B5EF4-FFF2-40B4-BE49-F238E27FC236}">
+                <a16:creationId xmlns:a16="http://schemas.microsoft.com/office/drawing/2014/main" id="{ADFBB425-74FE-4682-92FB-A9EEF77CABA7}"/>
+              </a:ext>
+            </a:extLst>
+          </p:cNvPr>
+          <p:cNvSpPr>
+            <a:spLocks noGrp="1"/>
+          </p:cNvSpPr>
+          <p:nvPr>
+            <p:ph idx="1"/>
+          </p:nvPr>
+        </p:nvSpPr>
+        <p:spPr/>
+        <p:txBody>
+          <a:bodyPr/>
+          <a:lstStyle/>
+          <a:p>
+            <a:r>
+              <a:rPr lang="en-US" dirty="0"/>
+              <a:t>Location</a:t>
+            </a:r>
+          </a:p>
+          <a:p>
+            <a:r>
+              <a:rPr lang="en-US" dirty="0"/>
+              <a:t>Size</a:t>
+            </a:r>
+          </a:p>
+          <a:p>
+            <a:r>
+              <a:rPr lang="en-US" dirty="0"/>
+              <a:t>Quality/condition</a:t>
+            </a:r>
+          </a:p>
+          <a:p>
+            <a:r>
+              <a:rPr lang="en-US" dirty="0"/>
+              <a:t>Amenities</a:t>
+            </a:r>
+          </a:p>
+        </p:txBody>
+      </p:sp>
+    </p:spTree>
+    <p:extLst>
+      <p:ext uri="{BB962C8B-B14F-4D97-AF65-F5344CB8AC3E}">
+        <p14:creationId xmlns:p14="http://schemas.microsoft.com/office/powerpoint/2010/main" val="2435323942"/>
+      </p:ext>
+    </p:extLst>
+  </p:cSld>
+  <p:clrMapOvr>
+    <a:masterClrMapping/>
+  </p:clrMapOvr>
+</p:sld>
+</file>
+
+<file path=ppt/slides/slide5.xml><?xml version="1.0" encoding="utf-8"?>
+<p:sld xmlns:a="http://schemas.openxmlformats.org/drawingml/2006/main" xmlns:r="http://schemas.openxmlformats.org/officeDocument/2006/relationships" xmlns:p="http://schemas.openxmlformats.org/presentationml/2006/main">
+  <p:cSld>
+    <p:spTree>
+      <p:nvGrpSpPr>
+        <p:cNvPr id="1" name=""/>
+        <p:cNvGrpSpPr/>
+        <p:nvPr/>
+      </p:nvGrpSpPr>
+      <p:grpSpPr>
+        <a:xfrm>
+          <a:off x="0" y="0"/>
+          <a:ext cx="0" cy="0"/>
+          <a:chOff x="0" y="0"/>
+          <a:chExt cx="0" cy="0"/>
+        </a:xfrm>
+      </p:grpSpPr>
+      <p:sp>
+        <p:nvSpPr>
+          <p:cNvPr id="2" name="Title 1">
+            <a:extLst>
+              <a:ext uri="{FF2B5EF4-FFF2-40B4-BE49-F238E27FC236}">
+                <a16:creationId xmlns:a16="http://schemas.microsoft.com/office/drawing/2014/main" id="{1D65F88D-CF3F-4ADB-86FE-1A21063D3C4B}"/>
+              </a:ext>
+            </a:extLst>
+          </p:cNvPr>
+          <p:cNvSpPr>
+            <a:spLocks noGrp="1"/>
+          </p:cNvSpPr>
+          <p:nvPr>
+            <p:ph type="title"/>
+          </p:nvPr>
+        </p:nvSpPr>
+        <p:spPr/>
+        <p:txBody>
+          <a:bodyPr/>
+          <a:lstStyle/>
+          <a:p>
+            <a:r>
+              <a:rPr lang="en-US" dirty="0"/>
+              <a:t>Multi-</a:t>
+            </a:r>
+            <a:r>
+              <a:rPr lang="en-US" dirty="0" err="1"/>
+              <a:t>colinearity</a:t>
+            </a:r>
+            <a:endParaRPr lang="en-US" dirty="0"/>
+          </a:p>
+        </p:txBody>
+      </p:sp>
+      <p:sp>
+        <p:nvSpPr>
+          <p:cNvPr id="3" name="Content Placeholder 2">
+            <a:extLst>
+              <a:ext uri="{FF2B5EF4-FFF2-40B4-BE49-F238E27FC236}">
+                <a16:creationId xmlns:a16="http://schemas.microsoft.com/office/drawing/2014/main" id="{88349F98-A0FD-40BB-B5D8-16B98C0FDEF8}"/>
+              </a:ext>
+            </a:extLst>
+          </p:cNvPr>
+          <p:cNvSpPr>
+            <a:spLocks noGrp="1"/>
+          </p:cNvSpPr>
+          <p:nvPr>
+            <p:ph idx="1"/>
+          </p:nvPr>
+        </p:nvSpPr>
+        <p:spPr/>
+        <p:txBody>
+          <a:bodyPr/>
+          <a:lstStyle/>
+          <a:p>
+            <a:endParaRPr lang="en-US"/>
+          </a:p>
+        </p:txBody>
+      </p:sp>
+    </p:spTree>
+    <p:extLst>
+      <p:ext uri="{BB962C8B-B14F-4D97-AF65-F5344CB8AC3E}">
+        <p14:creationId xmlns:p14="http://schemas.microsoft.com/office/powerpoint/2010/main" val="2442546921"/>
+      </p:ext>
+    </p:extLst>
+  </p:cSld>
+  <p:clrMapOvr>
+    <a:masterClrMapping/>
+  </p:clrMapOvr>
+</p:sld>
+</file>
+
+<file path=ppt/slides/slide6.xml><?xml version="1.0" encoding="utf-8"?>
+<p:sld xmlns:a="http://schemas.openxmlformats.org/drawingml/2006/main" xmlns:r="http://schemas.openxmlformats.org/officeDocument/2006/relationships" xmlns:p="http://schemas.openxmlformats.org/presentationml/2006/main">
+  <p:cSld>
+    <p:spTree>
+      <p:nvGrpSpPr>
+        <p:cNvPr id="1" name=""/>
+        <p:cNvGrpSpPr/>
+        <p:nvPr/>
+      </p:nvGrpSpPr>
+      <p:grpSpPr>
+        <a:xfrm>
+          <a:off x="0" y="0"/>
+          <a:ext cx="0" cy="0"/>
+          <a:chOff x="0" y="0"/>
+          <a:chExt cx="0" cy="0"/>
+        </a:xfrm>
+      </p:grpSpPr>
+      <p:sp>
+        <p:nvSpPr>
+          <p:cNvPr id="2" name="Title 1">
+            <a:extLst>
+              <a:ext uri="{FF2B5EF4-FFF2-40B4-BE49-F238E27FC236}">
+                <a16:creationId xmlns:a16="http://schemas.microsoft.com/office/drawing/2014/main" id="{928487A1-96D9-4E88-AF40-64485CC43659}"/>
+              </a:ext>
+            </a:extLst>
+          </p:cNvPr>
+          <p:cNvSpPr>
+            <a:spLocks noGrp="1"/>
+          </p:cNvSpPr>
+          <p:nvPr>
+            <p:ph type="title"/>
+          </p:nvPr>
+        </p:nvSpPr>
+        <p:spPr/>
+        <p:txBody>
+          <a:bodyPr/>
+          <a:lstStyle/>
+          <a:p>
+            <a:r>
+              <a:rPr lang="en-US" dirty="0"/>
+              <a:t>Outliers</a:t>
+            </a:r>
+          </a:p>
+        </p:txBody>
+      </p:sp>
+      <p:sp>
+        <p:nvSpPr>
+          <p:cNvPr id="3" name="Content Placeholder 2">
+            <a:extLst>
+              <a:ext uri="{FF2B5EF4-FFF2-40B4-BE49-F238E27FC236}">
+                <a16:creationId xmlns:a16="http://schemas.microsoft.com/office/drawing/2014/main" id="{DFF97AD6-45C3-4006-821D-BA1406A77EB5}"/>
+              </a:ext>
+            </a:extLst>
+          </p:cNvPr>
+          <p:cNvSpPr>
+            <a:spLocks noGrp="1"/>
+          </p:cNvSpPr>
+          <p:nvPr>
+            <p:ph idx="1"/>
+          </p:nvPr>
+        </p:nvSpPr>
+        <p:spPr/>
+        <p:txBody>
+          <a:bodyPr/>
+          <a:lstStyle/>
+          <a:p>
+            <a:endParaRPr lang="en-US"/>
+          </a:p>
+        </p:txBody>
+      </p:sp>
+    </p:spTree>
+    <p:extLst>
+      <p:ext uri="{BB962C8B-B14F-4D97-AF65-F5344CB8AC3E}">
+        <p14:creationId xmlns:p14="http://schemas.microsoft.com/office/powerpoint/2010/main" val="3646422994"/>
+      </p:ext>
+    </p:extLst>
+  </p:cSld>
+  <p:clrMapOvr>
+    <a:masterClrMapping/>
+  </p:clrMapOvr>
+</p:sld>
+</file>
+
+<file path=ppt/slides/slide7.xml><?xml version="1.0" encoding="utf-8"?>
+<p:sld xmlns:a="http://schemas.openxmlformats.org/drawingml/2006/main" xmlns:r="http://schemas.openxmlformats.org/officeDocument/2006/relationships" xmlns:p="http://schemas.openxmlformats.org/presentationml/2006/main">
+  <p:cSld>
+    <p:spTree>
+      <p:nvGrpSpPr>
+        <p:cNvPr id="1" name=""/>
+        <p:cNvGrpSpPr/>
+        <p:nvPr/>
+      </p:nvGrpSpPr>
+      <p:grpSpPr>
+        <a:xfrm>
+          <a:off x="0" y="0"/>
+          <a:ext cx="0" cy="0"/>
+          <a:chOff x="0" y="0"/>
+          <a:chExt cx="0" cy="0"/>
+        </a:xfrm>
+      </p:grpSpPr>
+      <p:sp>
+        <p:nvSpPr>
+          <p:cNvPr id="2" name="Title 1">
+            <a:extLst>
+              <a:ext uri="{FF2B5EF4-FFF2-40B4-BE49-F238E27FC236}">
+                <a16:creationId xmlns:a16="http://schemas.microsoft.com/office/drawing/2014/main" id="{928487A1-96D9-4E88-AF40-64485CC43659}"/>
+              </a:ext>
+            </a:extLst>
+          </p:cNvPr>
+          <p:cNvSpPr>
+            <a:spLocks noGrp="1"/>
+          </p:cNvSpPr>
+          <p:nvPr>
+            <p:ph type="title"/>
+          </p:nvPr>
+        </p:nvSpPr>
+        <p:spPr/>
+        <p:txBody>
+          <a:bodyPr/>
+          <a:lstStyle/>
+          <a:p>
+            <a:r>
+              <a:rPr lang="en-US" dirty="0"/>
+              <a:t>Regulation</a:t>
+            </a:r>
+          </a:p>
+        </p:txBody>
+      </p:sp>
+      <p:sp>
+        <p:nvSpPr>
+          <p:cNvPr id="3" name="Content Placeholder 2">
+            <a:extLst>
+              <a:ext uri="{FF2B5EF4-FFF2-40B4-BE49-F238E27FC236}">
+                <a16:creationId xmlns:a16="http://schemas.microsoft.com/office/drawing/2014/main" id="{DFF97AD6-45C3-4006-821D-BA1406A77EB5}"/>
+              </a:ext>
+            </a:extLst>
+          </p:cNvPr>
+          <p:cNvSpPr>
+            <a:spLocks noGrp="1"/>
+          </p:cNvSpPr>
+          <p:nvPr>
+            <p:ph idx="1"/>
+          </p:nvPr>
+        </p:nvSpPr>
+        <p:spPr/>
+        <p:txBody>
+          <a:bodyPr/>
+          <a:lstStyle/>
+          <a:p>
+            <a:endParaRPr lang="en-US"/>
+          </a:p>
+        </p:txBody>
+      </p:sp>
+    </p:spTree>
+    <p:extLst>
+      <p:ext uri="{BB962C8B-B14F-4D97-AF65-F5344CB8AC3E}">
+        <p14:creationId xmlns:p14="http://schemas.microsoft.com/office/powerpoint/2010/main" val="2505859810"/>
+      </p:ext>
+    </p:extLst>
+  </p:cSld>
+  <p:clrMapOvr>
+    <a:masterClrMapping/>
+  </p:clrMapOvr>
+</p:sld>
+</file>
+
+<file path=ppt/slides/slide8.xml><?xml version="1.0" encoding="utf-8"?>
+<p:sld xmlns:a="http://schemas.openxmlformats.org/drawingml/2006/main" xmlns:r="http://schemas.openxmlformats.org/officeDocument/2006/relationships" xmlns:p="http://schemas.openxmlformats.org/presentationml/2006/main">
+  <p:cSld>
+    <p:spTree>
+      <p:nvGrpSpPr>
+        <p:cNvPr id="1" name=""/>
+        <p:cNvGrpSpPr/>
+        <p:nvPr/>
+      </p:nvGrpSpPr>
+      <p:grpSpPr>
+        <a:xfrm>
+          <a:off x="0" y="0"/>
+          <a:ext cx="0" cy="0"/>
+          <a:chOff x="0" y="0"/>
+          <a:chExt cx="0" cy="0"/>
+        </a:xfrm>
+      </p:grpSpPr>
+      <p:sp>
+        <p:nvSpPr>
+          <p:cNvPr id="2" name="Title 1">
+            <a:extLst>
+              <a:ext uri="{FF2B5EF4-FFF2-40B4-BE49-F238E27FC236}">
+                <a16:creationId xmlns:a16="http://schemas.microsoft.com/office/drawing/2014/main" id="{928487A1-96D9-4E88-AF40-64485CC43659}"/>
+              </a:ext>
+            </a:extLst>
+          </p:cNvPr>
+          <p:cNvSpPr>
+            <a:spLocks noGrp="1"/>
+          </p:cNvSpPr>
+          <p:nvPr>
+            <p:ph type="title"/>
+          </p:nvPr>
+        </p:nvSpPr>
+        <p:spPr/>
+        <p:txBody>
+          <a:bodyPr/>
+          <a:lstStyle/>
+          <a:p>
+            <a:r>
+              <a:rPr lang="en-US" dirty="0"/>
+              <a:t>Models Tested</a:t>
+            </a:r>
+          </a:p>
+        </p:txBody>
+      </p:sp>
+      <p:sp>
+        <p:nvSpPr>
+          <p:cNvPr id="3" name="Content Placeholder 2">
+            <a:extLst>
+              <a:ext uri="{FF2B5EF4-FFF2-40B4-BE49-F238E27FC236}">
+                <a16:creationId xmlns:a16="http://schemas.microsoft.com/office/drawing/2014/main" id="{DFF97AD6-45C3-4006-821D-BA1406A77EB5}"/>
+              </a:ext>
+            </a:extLst>
+          </p:cNvPr>
+          <p:cNvSpPr>
+            <a:spLocks noGrp="1"/>
+          </p:cNvSpPr>
+          <p:nvPr>
+            <p:ph idx="1"/>
+          </p:nvPr>
+        </p:nvSpPr>
+        <p:spPr/>
+        <p:txBody>
+          <a:bodyPr/>
+          <a:lstStyle/>
+          <a:p>
+            <a:r>
+              <a:rPr lang="en-US" dirty="0"/>
+              <a:t>Used CV and </a:t>
+            </a:r>
+            <a:r>
+              <a:rPr lang="en-US" dirty="0" err="1"/>
+              <a:t>gridsearch</a:t>
+            </a:r>
+            <a:endParaRPr lang="en-US" dirty="0"/>
+          </a:p>
+          <a:p>
+            <a:r>
+              <a:rPr lang="en-US" dirty="0"/>
+              <a:t>Validated with separate data</a:t>
+            </a:r>
+          </a:p>
+        </p:txBody>
+      </p:sp>
+    </p:spTree>
+    <p:extLst>
+      <p:ext uri="{BB962C8B-B14F-4D97-AF65-F5344CB8AC3E}">
+        <p14:creationId xmlns:p14="http://schemas.microsoft.com/office/powerpoint/2010/main" val="3410511188"/>
+      </p:ext>
+    </p:extLst>
+  </p:cSld>
+  <p:clrMapOvr>
+    <a:masterClrMapping/>
+  </p:clrMapOvr>
+</p:sld>
+</file>
+
+<file path=ppt/slides/slide9.xml><?xml version="1.0" encoding="utf-8"?>
+<p:sld xmlns:a="http://schemas.openxmlformats.org/drawingml/2006/main" xmlns:r="http://schemas.openxmlformats.org/officeDocument/2006/relationships" xmlns:p="http://schemas.openxmlformats.org/presentationml/2006/main">
+  <p:cSld>
+    <p:spTree>
+      <p:nvGrpSpPr>
+        <p:cNvPr id="1" name=""/>
+        <p:cNvGrpSpPr/>
+        <p:nvPr/>
+      </p:nvGrpSpPr>
+      <p:grpSpPr>
+        <a:xfrm>
+          <a:off x="0" y="0"/>
+          <a:ext cx="0" cy="0"/>
+          <a:chOff x="0" y="0"/>
+          <a:chExt cx="0" cy="0"/>
+        </a:xfrm>
+      </p:grpSpPr>
+      <p:sp>
+        <p:nvSpPr>
+          <p:cNvPr id="2" name="Title 1">
+            <a:extLst>
+              <a:ext uri="{FF2B5EF4-FFF2-40B4-BE49-F238E27FC236}">
+                <a16:creationId xmlns:a16="http://schemas.microsoft.com/office/drawing/2014/main" id="{928487A1-96D9-4E88-AF40-64485CC43659}"/>
+              </a:ext>
+            </a:extLst>
+          </p:cNvPr>
+          <p:cNvSpPr>
+            <a:spLocks noGrp="1"/>
+          </p:cNvSpPr>
+          <p:nvPr>
+            <p:ph type="title"/>
+          </p:nvPr>
+        </p:nvSpPr>
+        <p:spPr/>
+        <p:txBody>
+          <a:bodyPr/>
+          <a:lstStyle/>
+          <a:p>
+            <a:r>
+              <a:rPr lang="en-US" dirty="0"/>
+              <a:t>What model is best and how well it does.</a:t>
+            </a:r>
+          </a:p>
+        </p:txBody>
+      </p:sp>
+      <p:sp>
+        <p:nvSpPr>
+          <p:cNvPr id="3" name="Content Placeholder 2">
+            <a:extLst>
+              <a:ext uri="{FF2B5EF4-FFF2-40B4-BE49-F238E27FC236}">
+                <a16:creationId xmlns:a16="http://schemas.microsoft.com/office/drawing/2014/main" id="{DFF97AD6-45C3-4006-821D-BA1406A77EB5}"/>
+              </a:ext>
+            </a:extLst>
+          </p:cNvPr>
+          <p:cNvSpPr>
+            <a:spLocks noGrp="1"/>
+          </p:cNvSpPr>
+          <p:nvPr>
+            <p:ph idx="1"/>
+          </p:nvPr>
+        </p:nvSpPr>
+        <p:spPr/>
+        <p:txBody>
+          <a:bodyPr/>
+          <a:lstStyle/>
+          <a:p>
+            <a:endParaRPr lang="en-US"/>
+          </a:p>
+        </p:txBody>
+      </p:sp>
+    </p:spTree>
+    <p:extLst>
+      <p:ext uri="{BB962C8B-B14F-4D97-AF65-F5344CB8AC3E}">
+        <p14:creationId xmlns:p14="http://schemas.microsoft.com/office/powerpoint/2010/main" val="3627546746"/>
       </p:ext>
     </p:extLst>
   </p:cSld>

</xml_diff>